<commit_message>
PCA comments and add survey cleanup to final submission
</commit_message>
<xml_diff>
--- a/Slides/Nipun Slides.pptx
+++ b/Slides/Nipun Slides.pptx
@@ -122,7 +122,18 @@
   </p:defaultTextStyle>
   <p:extLst>
     <p:ext uri="{EFAFB233-063F-42B5-8137-9DF3F51BA10A}">
-      <p15:sldGuideLst xmlns:p15="http://schemas.microsoft.com/office/powerpoint/2012/main" xmlns=""/>
+      <p15:sldGuideLst xmlns:p15="http://schemas.microsoft.com/office/powerpoint/2012/main">
+        <p15:guide id="1" orient="horz" pos="2160">
+          <p15:clr>
+            <a:srgbClr val="A4A3A4"/>
+          </p15:clr>
+        </p15:guide>
+        <p15:guide id="2" pos="3840">
+          <p15:clr>
+            <a:srgbClr val="A4A3A4"/>
+          </p15:clr>
+        </p15:guide>
+      </p15:sldGuideLst>
     </p:ext>
   </p:extLst>
 </p:presentation>
@@ -210,7 +221,7 @@
           <a:p>
             <a:fld id="{1F610506-66FC-CF4B-A9AD-E95B9DFBCF86}" type="datetimeFigureOut">
               <a:rPr lang="en-US" smtClean="0"/>
-              <a:t>12/2/16</a:t>
+              <a:t>12/2/2016</a:t>
             </a:fld>
             <a:endParaRPr lang="en-US"/>
           </a:p>
@@ -274,38 +285,37 @@
           <a:p>
             <a:pPr lvl="0"/>
             <a:r>
-              <a:rPr lang="en-US" smtClean="0"/>
+              <a:rPr lang="en-US"/>
               <a:t>Click to edit Master text styles</a:t>
             </a:r>
           </a:p>
           <a:p>
             <a:pPr lvl="1"/>
             <a:r>
-              <a:rPr lang="en-US" smtClean="0"/>
+              <a:rPr lang="en-US"/>
               <a:t>Second level</a:t>
             </a:r>
           </a:p>
           <a:p>
             <a:pPr lvl="2"/>
             <a:r>
-              <a:rPr lang="en-US" smtClean="0"/>
+              <a:rPr lang="en-US"/>
               <a:t>Third level</a:t>
             </a:r>
           </a:p>
           <a:p>
             <a:pPr lvl="3"/>
             <a:r>
-              <a:rPr lang="en-US" smtClean="0"/>
+              <a:rPr lang="en-US"/>
               <a:t>Fourth level</a:t>
             </a:r>
           </a:p>
           <a:p>
             <a:pPr lvl="4"/>
             <a:r>
-              <a:rPr lang="en-US" smtClean="0"/>
+              <a:rPr lang="en-US"/>
               <a:t>Fifth level</a:t>
             </a:r>
-            <a:endParaRPr lang="en-US"/>
           </a:p>
         </p:txBody>
       </p:sp>
@@ -523,341 +533,14 @@
           <a:lstStyle/>
           <a:p>
             <a:r>
-              <a:rPr lang="en-US" dirty="0" smtClean="0"/>
-              <a:t>In order to classify this data, we grouped the alcohol consumption ratings</a:t>
-            </a:r>
-            <a:r>
-              <a:rPr lang="en-US" baseline="0" dirty="0" smtClean="0"/>
-              <a:t> into a “low” group with ratings 1-3 and a “high” group with ratings 4-5.</a:t>
-            </a:r>
-            <a:endParaRPr lang="en-US" dirty="0" smtClean="0"/>
-          </a:p>
-          <a:p>
-            <a:endParaRPr lang="en-US" dirty="0" smtClean="0"/>
-          </a:p>
-          <a:p>
-            <a:r>
-              <a:rPr lang="en-US" dirty="0" smtClean="0"/>
-              <a:t>To test accuracy of models, the </a:t>
-            </a:r>
-            <a:r>
-              <a:rPr lang="en-US" dirty="0" err="1" smtClean="0"/>
-              <a:t>cross_val_predict</a:t>
-            </a:r>
-            <a:r>
-              <a:rPr lang="en-US" dirty="0" smtClean="0"/>
-              <a:t> function was used, splitting the dataset into 2 for training and testing.</a:t>
-            </a:r>
-          </a:p>
-          <a:p>
-            <a:endParaRPr lang="en-US" dirty="0" smtClean="0"/>
-          </a:p>
-          <a:p>
-            <a:r>
-              <a:rPr lang="en-US" dirty="0" smtClean="0"/>
-              <a:t>Tried</a:t>
-            </a:r>
-            <a:r>
-              <a:rPr lang="en-US" baseline="0" dirty="0" smtClean="0"/>
-              <a:t> to classify weekday and weekend alcohol consumption separately using all the variables in the dataset</a:t>
-            </a:r>
-            <a:endParaRPr lang="en-US" dirty="0" smtClean="0"/>
-          </a:p>
-          <a:p>
-            <a:endParaRPr lang="en-US" dirty="0" smtClean="0"/>
-          </a:p>
-          <a:p>
-            <a:r>
-              <a:rPr lang="en-US" dirty="0" smtClean="0"/>
-              <a:t>Considered SVM, Decision Trees, and k-Nearest</a:t>
-            </a:r>
-            <a:r>
-              <a:rPr lang="en-US" baseline="0" dirty="0" smtClean="0"/>
-              <a:t> Neighbors</a:t>
-            </a:r>
-            <a:endParaRPr lang="en-US" dirty="0" smtClean="0"/>
-          </a:p>
-          <a:p>
-            <a:endParaRPr lang="en-US" dirty="0" smtClean="0"/>
-          </a:p>
-          <a:p>
-            <a:r>
-              <a:rPr lang="en-US" dirty="0" smtClean="0"/>
-              <a:t>These are the parameters that resulted in the highest accuracies</a:t>
-            </a:r>
-          </a:p>
-          <a:p>
-            <a:endParaRPr lang="en-US" dirty="0" smtClean="0"/>
-          </a:p>
-          <a:p>
-            <a:r>
-              <a:rPr lang="en-US" dirty="0" smtClean="0"/>
-              <a:t>If the independent</a:t>
-            </a:r>
-            <a:r>
-              <a:rPr lang="en-US" baseline="0" dirty="0" smtClean="0"/>
-              <a:t> variables were limited, accuracies went down.</a:t>
-            </a:r>
-          </a:p>
-          <a:p>
-            <a:endParaRPr lang="en-US" baseline="0" dirty="0" smtClean="0"/>
-          </a:p>
-          <a:p>
-            <a:pPr marL="0" marR="0" indent="0" algn="l" defTabSz="457200" rtl="0" eaLnBrk="1" fontAlgn="auto" latinLnBrk="0" hangingPunct="1">
-              <a:lnSpc>
-                <a:spcPct val="100000"/>
-              </a:lnSpc>
-              <a:spcBef>
-                <a:spcPts val="0"/>
-              </a:spcBef>
-              <a:spcAft>
-                <a:spcPts val="0"/>
-              </a:spcAft>
-              <a:buClrTx/>
-              <a:buSzTx/>
-              <a:buFontTx/>
-              <a:buNone/>
-              <a:tabLst/>
-              <a:defRPr/>
-            </a:pPr>
-            <a:r>
-              <a:rPr lang="en-US" baseline="0" dirty="0" smtClean="0"/>
-              <a:t>We also tried using neural networks</a:t>
-            </a:r>
-          </a:p>
-          <a:p>
-            <a:pPr marL="0" marR="0" indent="0" algn="l" defTabSz="457200" rtl="0" eaLnBrk="1" fontAlgn="auto" latinLnBrk="0" hangingPunct="1">
-              <a:lnSpc>
-                <a:spcPct val="100000"/>
-              </a:lnSpc>
-              <a:spcBef>
-                <a:spcPts val="0"/>
-              </a:spcBef>
-              <a:spcAft>
-                <a:spcPts val="0"/>
-              </a:spcAft>
-              <a:buClrTx/>
-              <a:buSzTx/>
-              <a:buFontTx/>
-              <a:buNone/>
-              <a:tabLst/>
-              <a:defRPr/>
-            </a:pPr>
-            <a:r>
-              <a:rPr lang="en-US" baseline="0" dirty="0" smtClean="0"/>
-              <a:t>	[and found 125 nodes consistently produced the best results, despite random initialization]</a:t>
-            </a:r>
-          </a:p>
-          <a:p>
-            <a:pPr marL="0" marR="0" indent="0" algn="l" defTabSz="457200" rtl="0" eaLnBrk="1" fontAlgn="auto" latinLnBrk="0" hangingPunct="1">
-              <a:lnSpc>
-                <a:spcPct val="100000"/>
-              </a:lnSpc>
-              <a:spcBef>
-                <a:spcPts val="0"/>
-              </a:spcBef>
-              <a:spcAft>
-                <a:spcPts val="0"/>
-              </a:spcAft>
-              <a:buClrTx/>
-              <a:buSzTx/>
-              <a:buFontTx/>
-              <a:buNone/>
-              <a:tabLst/>
-              <a:defRPr/>
-            </a:pPr>
-            <a:r>
-              <a:rPr lang="en-US" baseline="0" dirty="0" smtClean="0"/>
-              <a:t>	[However, behavior was similar to SVM, and even did a little worse on weekend alcohol consumption]</a:t>
-            </a:r>
-            <a:endParaRPr lang="en-US" baseline="0" dirty="0" smtClean="0"/>
-          </a:p>
-          <a:p>
-            <a:endParaRPr lang="en-US" baseline="0" dirty="0" smtClean="0"/>
-          </a:p>
-          <a:p>
-            <a:pPr marL="0" marR="0" indent="0" algn="l" defTabSz="457200" rtl="0" eaLnBrk="1" fontAlgn="auto" latinLnBrk="0" hangingPunct="1">
-              <a:lnSpc>
-                <a:spcPct val="100000"/>
-              </a:lnSpc>
-              <a:spcBef>
-                <a:spcPts val="0"/>
-              </a:spcBef>
-              <a:spcAft>
-                <a:spcPts val="0"/>
-              </a:spcAft>
-              <a:buClrTx/>
-              <a:buSzTx/>
-              <a:buFontTx/>
-              <a:buNone/>
-              <a:tabLst/>
-              <a:defRPr/>
-            </a:pPr>
-            <a:r>
-              <a:rPr lang="en-US" dirty="0" smtClean="0"/>
-              <a:t>Had</a:t>
-            </a:r>
-            <a:r>
-              <a:rPr lang="en-US" baseline="0" dirty="0" smtClean="0"/>
-              <a:t> h</a:t>
-            </a:r>
-            <a:r>
-              <a:rPr lang="en-US" dirty="0" smtClean="0"/>
-              <a:t>igher accuracies for weekday models – however highest accuracies for those models arise from assuming low alcohol consumption regardless of input</a:t>
-            </a:r>
-            <a:r>
-              <a:rPr lang="en-US" baseline="0" dirty="0" smtClean="0"/>
-              <a:t> variables since the majority of the training data had low ratings (94.9%), seen in the confusion matrix here</a:t>
-            </a:r>
-          </a:p>
-          <a:p>
-            <a:pPr marL="0" marR="0" indent="0" algn="l" defTabSz="457200" rtl="0" eaLnBrk="1" fontAlgn="auto" latinLnBrk="0" hangingPunct="1">
-              <a:lnSpc>
-                <a:spcPct val="100000"/>
-              </a:lnSpc>
-              <a:spcBef>
-                <a:spcPts val="0"/>
-              </a:spcBef>
-              <a:spcAft>
-                <a:spcPts val="0"/>
-              </a:spcAft>
-              <a:buClrTx/>
-              <a:buSzTx/>
-              <a:buFontTx/>
-              <a:buNone/>
-              <a:tabLst/>
-              <a:defRPr/>
-            </a:pPr>
-            <a:endParaRPr lang="en-US" baseline="0" dirty="0" smtClean="0"/>
-          </a:p>
-          <a:p>
-            <a:pPr marL="0" marR="0" indent="0" algn="l" defTabSz="457200" rtl="0" eaLnBrk="1" fontAlgn="auto" latinLnBrk="0" hangingPunct="1">
-              <a:lnSpc>
-                <a:spcPct val="100000"/>
-              </a:lnSpc>
-              <a:spcBef>
-                <a:spcPts val="0"/>
-              </a:spcBef>
-              <a:spcAft>
-                <a:spcPts val="0"/>
-              </a:spcAft>
-              <a:buClrTx/>
-              <a:buSzTx/>
-              <a:buFontTx/>
-              <a:buNone/>
-              <a:tabLst/>
-              <a:defRPr/>
-            </a:pPr>
-            <a:r>
-              <a:rPr lang="en-US" baseline="0" dirty="0" smtClean="0"/>
-              <a:t>Weekend models did a better job at trying to predict high alcohol consumption, even though they had lower accuracies : Decision Trees ended up with the highest accuracy of 84.2%</a:t>
-            </a:r>
-          </a:p>
-          <a:p>
-            <a:pPr marL="0" marR="0" indent="0" algn="l" defTabSz="457200" rtl="0" eaLnBrk="1" fontAlgn="auto" latinLnBrk="0" hangingPunct="1">
-              <a:lnSpc>
-                <a:spcPct val="100000"/>
-              </a:lnSpc>
-              <a:spcBef>
-                <a:spcPts val="0"/>
-              </a:spcBef>
-              <a:spcAft>
-                <a:spcPts val="0"/>
-              </a:spcAft>
-              <a:buClrTx/>
-              <a:buSzTx/>
-              <a:buFontTx/>
-              <a:buNone/>
-              <a:tabLst/>
-              <a:defRPr/>
-            </a:pPr>
-            <a:endParaRPr lang="en-US" baseline="0" dirty="0" smtClean="0"/>
-          </a:p>
-          <a:p>
-            <a:pPr marL="0" marR="0" indent="0" algn="l" defTabSz="457200" rtl="0" eaLnBrk="1" fontAlgn="auto" latinLnBrk="0" hangingPunct="1">
-              <a:lnSpc>
-                <a:spcPct val="100000"/>
-              </a:lnSpc>
-              <a:spcBef>
-                <a:spcPts val="0"/>
-              </a:spcBef>
-              <a:spcAft>
-                <a:spcPts val="0"/>
-              </a:spcAft>
-              <a:buClrTx/>
-              <a:buSzTx/>
-              <a:buFontTx/>
-              <a:buNone/>
-              <a:tabLst/>
-              <a:defRPr/>
-            </a:pPr>
-            <a:r>
-              <a:rPr lang="en-US" baseline="0" dirty="0" smtClean="0"/>
-              <a:t>	[Decision Tree Primary splits: Father’s job]</a:t>
-            </a:r>
-          </a:p>
-          <a:p>
-            <a:pPr marL="0" marR="0" indent="0" algn="l" defTabSz="457200" rtl="0" eaLnBrk="1" fontAlgn="auto" latinLnBrk="0" hangingPunct="1">
-              <a:lnSpc>
-                <a:spcPct val="100000"/>
-              </a:lnSpc>
-              <a:spcBef>
-                <a:spcPts val="0"/>
-              </a:spcBef>
-              <a:spcAft>
-                <a:spcPts val="0"/>
-              </a:spcAft>
-              <a:buClrTx/>
-              <a:buSzTx/>
-              <a:buFontTx/>
-              <a:buNone/>
-              <a:tabLst/>
-              <a:defRPr/>
-            </a:pPr>
-            <a:endParaRPr lang="en-US" baseline="0" dirty="0" smtClean="0"/>
-          </a:p>
-          <a:p>
-            <a:pPr marL="0" marR="0" indent="0" algn="l" defTabSz="457200" rtl="0" eaLnBrk="1" fontAlgn="auto" latinLnBrk="0" hangingPunct="1">
-              <a:lnSpc>
-                <a:spcPct val="100000"/>
-              </a:lnSpc>
-              <a:spcBef>
-                <a:spcPts val="0"/>
-              </a:spcBef>
-              <a:spcAft>
-                <a:spcPts val="0"/>
-              </a:spcAft>
-              <a:buClrTx/>
-              <a:buSzTx/>
-              <a:buFontTx/>
-              <a:buNone/>
-              <a:tabLst/>
-              <a:defRPr/>
-            </a:pPr>
-            <a:r>
-              <a:rPr lang="en-US" baseline="0" dirty="0" smtClean="0"/>
-              <a:t>	[If a rating of 3 was considered high instead of low, accuracies also went down, but the models did better at trying to predict high alcohol 	consumption. However, we stuck with keeping 3 in the low category due to wording in the survey.]</a:t>
-            </a:r>
-          </a:p>
-          <a:p>
-            <a:pPr marL="0" marR="0" indent="0" algn="l" defTabSz="457200" rtl="0" eaLnBrk="1" fontAlgn="auto" latinLnBrk="0" hangingPunct="1">
-              <a:lnSpc>
-                <a:spcPct val="100000"/>
-              </a:lnSpc>
-              <a:spcBef>
-                <a:spcPts val="0"/>
-              </a:spcBef>
-              <a:spcAft>
-                <a:spcPts val="0"/>
-              </a:spcAft>
-              <a:buClrTx/>
-              <a:buSzTx/>
-              <a:buFontTx/>
-              <a:buNone/>
-              <a:tabLst/>
-              <a:defRPr/>
-            </a:pPr>
-            <a:endParaRPr lang="en-US" baseline="0" dirty="0" smtClean="0"/>
+              <a:rPr lang="en-US" dirty="0"/>
+              <a:t>We</a:t>
+            </a:r>
+            <a:r>
+              <a:rPr lang="en-US" baseline="0" dirty="0"/>
+              <a:t> used data gathered from 2 Portuguese secondary schools.  Alcohol consumption was rated from 1-very low to 5-very high.  We also gathered data from University of Utah students through a survey.  Our major data cleaning challenge involved merging data for students who were surveyed twice.</a:t>
+            </a:r>
+            <a:endParaRPr lang="en-US" dirty="0"/>
           </a:p>
         </p:txBody>
       </p:sp>
@@ -876,9 +559,9 @@
           <a:bodyPr/>
           <a:lstStyle/>
           <a:p>
-            <a:fld id="{74676316-F0E1-404C-9137-82F8B80F0ABA}" type="slidenum">
+            <a:fld id="{F45F298B-74C0-B045-BDBE-1A2F42CC094F}" type="slidenum">
               <a:rPr lang="en-US" smtClean="0"/>
-              <a:t>3</a:t>
+              <a:t>1</a:t>
             </a:fld>
             <a:endParaRPr lang="en-US"/>
           </a:p>
@@ -887,7 +570,7 @@
     </p:spTree>
     <p:extLst>
       <p:ext uri="{BB962C8B-B14F-4D97-AF65-F5344CB8AC3E}">
-        <p14:creationId xmlns:p14="http://schemas.microsoft.com/office/powerpoint/2010/main" val="1352575294"/>
+        <p14:creationId xmlns:p14="http://schemas.microsoft.com/office/powerpoint/2010/main" val="3125152023"/>
       </p:ext>
     </p:extLst>
   </p:cSld>
@@ -942,73 +625,491 @@
           <a:lstStyle/>
           <a:p>
             <a:r>
-              <a:rPr lang="en-US" dirty="0" smtClean="0"/>
+              <a:rPr lang="en-US" dirty="0"/>
+              <a:t>In order to classify this data, we grouped the alcohol consumption ratings</a:t>
+            </a:r>
+            <a:r>
+              <a:rPr lang="en-US" baseline="0" dirty="0"/>
+              <a:t> into a “low” group with ratings 1-3 and a “high” group with ratings 4-5.</a:t>
+            </a:r>
+            <a:endParaRPr lang="en-US" dirty="0"/>
+          </a:p>
+          <a:p>
+            <a:endParaRPr lang="en-US" dirty="0"/>
+          </a:p>
+          <a:p>
+            <a:r>
+              <a:rPr lang="en-US" dirty="0"/>
+              <a:t>To test accuracy of models, the </a:t>
+            </a:r>
+            <a:r>
+              <a:rPr lang="en-US" dirty="0" err="1"/>
+              <a:t>cross_val_predict</a:t>
+            </a:r>
+            <a:r>
+              <a:rPr lang="en-US" dirty="0"/>
+              <a:t> function was used, splitting the dataset into 2 for training and testing.</a:t>
+            </a:r>
+          </a:p>
+          <a:p>
+            <a:endParaRPr lang="en-US" dirty="0"/>
+          </a:p>
+          <a:p>
+            <a:r>
+              <a:rPr lang="en-US" dirty="0"/>
+              <a:t>Tried</a:t>
+            </a:r>
+            <a:r>
+              <a:rPr lang="en-US" baseline="0" dirty="0"/>
+              <a:t> to classify weekday and weekend alcohol consumption separately using all the variables in the dataset</a:t>
+            </a:r>
+            <a:endParaRPr lang="en-US" dirty="0"/>
+          </a:p>
+          <a:p>
+            <a:endParaRPr lang="en-US" dirty="0"/>
+          </a:p>
+          <a:p>
+            <a:r>
+              <a:rPr lang="en-US" dirty="0"/>
+              <a:t>Considered SVM, Decision Trees, and k-Nearest</a:t>
+            </a:r>
+            <a:r>
+              <a:rPr lang="en-US" baseline="0" dirty="0"/>
+              <a:t> Neighbors</a:t>
+            </a:r>
+            <a:endParaRPr lang="en-US" dirty="0"/>
+          </a:p>
+          <a:p>
+            <a:endParaRPr lang="en-US" dirty="0"/>
+          </a:p>
+          <a:p>
+            <a:r>
+              <a:rPr lang="en-US" dirty="0"/>
+              <a:t>These are the parameters that resulted in the highest accuracies</a:t>
+            </a:r>
+          </a:p>
+          <a:p>
+            <a:endParaRPr lang="en-US" dirty="0"/>
+          </a:p>
+          <a:p>
+            <a:r>
+              <a:rPr lang="en-US" dirty="0"/>
+              <a:t>If the independent</a:t>
+            </a:r>
+            <a:r>
+              <a:rPr lang="en-US" baseline="0" dirty="0"/>
+              <a:t> variables were limited, accuracies went down.</a:t>
+            </a:r>
+          </a:p>
+          <a:p>
+            <a:endParaRPr lang="en-US" baseline="0" dirty="0"/>
+          </a:p>
+          <a:p>
+            <a:pPr marL="0" marR="0" indent="0" algn="l" defTabSz="457200" rtl="0" eaLnBrk="1" fontAlgn="auto" latinLnBrk="0" hangingPunct="1">
+              <a:lnSpc>
+                <a:spcPct val="100000"/>
+              </a:lnSpc>
+              <a:spcBef>
+                <a:spcPts val="0"/>
+              </a:spcBef>
+              <a:spcAft>
+                <a:spcPts val="0"/>
+              </a:spcAft>
+              <a:buClrTx/>
+              <a:buSzTx/>
+              <a:buFontTx/>
+              <a:buNone/>
+              <a:tabLst/>
+              <a:defRPr/>
+            </a:pPr>
+            <a:r>
+              <a:rPr lang="en-US" baseline="0" dirty="0"/>
+              <a:t>We also tried using neural networks</a:t>
+            </a:r>
+          </a:p>
+          <a:p>
+            <a:pPr marL="0" marR="0" indent="0" algn="l" defTabSz="457200" rtl="0" eaLnBrk="1" fontAlgn="auto" latinLnBrk="0" hangingPunct="1">
+              <a:lnSpc>
+                <a:spcPct val="100000"/>
+              </a:lnSpc>
+              <a:spcBef>
+                <a:spcPts val="0"/>
+              </a:spcBef>
+              <a:spcAft>
+                <a:spcPts val="0"/>
+              </a:spcAft>
+              <a:buClrTx/>
+              <a:buSzTx/>
+              <a:buFontTx/>
+              <a:buNone/>
+              <a:tabLst/>
+              <a:defRPr/>
+            </a:pPr>
+            <a:r>
+              <a:rPr lang="en-US" baseline="0" dirty="0"/>
+              <a:t>	[and found 125 nodes consistently produced the best results, despite random initialization]</a:t>
+            </a:r>
+          </a:p>
+          <a:p>
+            <a:pPr marL="0" marR="0" indent="0" algn="l" defTabSz="457200" rtl="0" eaLnBrk="1" fontAlgn="auto" latinLnBrk="0" hangingPunct="1">
+              <a:lnSpc>
+                <a:spcPct val="100000"/>
+              </a:lnSpc>
+              <a:spcBef>
+                <a:spcPts val="0"/>
+              </a:spcBef>
+              <a:spcAft>
+                <a:spcPts val="0"/>
+              </a:spcAft>
+              <a:buClrTx/>
+              <a:buSzTx/>
+              <a:buFontTx/>
+              <a:buNone/>
+              <a:tabLst/>
+              <a:defRPr/>
+            </a:pPr>
+            <a:r>
+              <a:rPr lang="en-US" baseline="0" dirty="0"/>
+              <a:t>	[However, behavior was similar to SVM, and even did a little worse on weekend alcohol consumption]</a:t>
+            </a:r>
+          </a:p>
+          <a:p>
+            <a:endParaRPr lang="en-US" baseline="0" dirty="0"/>
+          </a:p>
+          <a:p>
+            <a:pPr marL="0" marR="0" indent="0" algn="l" defTabSz="457200" rtl="0" eaLnBrk="1" fontAlgn="auto" latinLnBrk="0" hangingPunct="1">
+              <a:lnSpc>
+                <a:spcPct val="100000"/>
+              </a:lnSpc>
+              <a:spcBef>
+                <a:spcPts val="0"/>
+              </a:spcBef>
+              <a:spcAft>
+                <a:spcPts val="0"/>
+              </a:spcAft>
+              <a:buClrTx/>
+              <a:buSzTx/>
+              <a:buFontTx/>
+              <a:buNone/>
+              <a:tabLst/>
+              <a:defRPr/>
+            </a:pPr>
+            <a:r>
+              <a:rPr lang="en-US" dirty="0"/>
+              <a:t>Had</a:t>
+            </a:r>
+            <a:r>
+              <a:rPr lang="en-US" baseline="0" dirty="0"/>
+              <a:t> h</a:t>
+            </a:r>
+            <a:r>
+              <a:rPr lang="en-US" dirty="0"/>
+              <a:t>igher accuracies for weekday models – however highest accuracies for those models arise from assuming low alcohol consumption regardless of input</a:t>
+            </a:r>
+            <a:r>
+              <a:rPr lang="en-US" baseline="0" dirty="0"/>
+              <a:t> variables since the majority of the training data had low ratings (94.9%), seen in the confusion matrix here</a:t>
+            </a:r>
+          </a:p>
+          <a:p>
+            <a:pPr marL="0" marR="0" indent="0" algn="l" defTabSz="457200" rtl="0" eaLnBrk="1" fontAlgn="auto" latinLnBrk="0" hangingPunct="1">
+              <a:lnSpc>
+                <a:spcPct val="100000"/>
+              </a:lnSpc>
+              <a:spcBef>
+                <a:spcPts val="0"/>
+              </a:spcBef>
+              <a:spcAft>
+                <a:spcPts val="0"/>
+              </a:spcAft>
+              <a:buClrTx/>
+              <a:buSzTx/>
+              <a:buFontTx/>
+              <a:buNone/>
+              <a:tabLst/>
+              <a:defRPr/>
+            </a:pPr>
+            <a:endParaRPr lang="en-US" baseline="0" dirty="0"/>
+          </a:p>
+          <a:p>
+            <a:pPr marL="0" marR="0" indent="0" algn="l" defTabSz="457200" rtl="0" eaLnBrk="1" fontAlgn="auto" latinLnBrk="0" hangingPunct="1">
+              <a:lnSpc>
+                <a:spcPct val="100000"/>
+              </a:lnSpc>
+              <a:spcBef>
+                <a:spcPts val="0"/>
+              </a:spcBef>
+              <a:spcAft>
+                <a:spcPts val="0"/>
+              </a:spcAft>
+              <a:buClrTx/>
+              <a:buSzTx/>
+              <a:buFontTx/>
+              <a:buNone/>
+              <a:tabLst/>
+              <a:defRPr/>
+            </a:pPr>
+            <a:r>
+              <a:rPr lang="en-US" baseline="0" dirty="0"/>
+              <a:t>Weekend models did a better job at trying to predict high alcohol consumption, even though they had lower accuracies : Decision Trees ended up with the highest accuracy of 84.2%</a:t>
+            </a:r>
+          </a:p>
+          <a:p>
+            <a:pPr marL="0" marR="0" indent="0" algn="l" defTabSz="457200" rtl="0" eaLnBrk="1" fontAlgn="auto" latinLnBrk="0" hangingPunct="1">
+              <a:lnSpc>
+                <a:spcPct val="100000"/>
+              </a:lnSpc>
+              <a:spcBef>
+                <a:spcPts val="0"/>
+              </a:spcBef>
+              <a:spcAft>
+                <a:spcPts val="0"/>
+              </a:spcAft>
+              <a:buClrTx/>
+              <a:buSzTx/>
+              <a:buFontTx/>
+              <a:buNone/>
+              <a:tabLst/>
+              <a:defRPr/>
+            </a:pPr>
+            <a:endParaRPr lang="en-US" baseline="0" dirty="0"/>
+          </a:p>
+          <a:p>
+            <a:pPr marL="0" marR="0" indent="0" algn="l" defTabSz="457200" rtl="0" eaLnBrk="1" fontAlgn="auto" latinLnBrk="0" hangingPunct="1">
+              <a:lnSpc>
+                <a:spcPct val="100000"/>
+              </a:lnSpc>
+              <a:spcBef>
+                <a:spcPts val="0"/>
+              </a:spcBef>
+              <a:spcAft>
+                <a:spcPts val="0"/>
+              </a:spcAft>
+              <a:buClrTx/>
+              <a:buSzTx/>
+              <a:buFontTx/>
+              <a:buNone/>
+              <a:tabLst/>
+              <a:defRPr/>
+            </a:pPr>
+            <a:r>
+              <a:rPr lang="en-US" baseline="0" dirty="0"/>
+              <a:t>	[Decision Tree Primary splits: Father’s job]</a:t>
+            </a:r>
+          </a:p>
+          <a:p>
+            <a:pPr marL="0" marR="0" indent="0" algn="l" defTabSz="457200" rtl="0" eaLnBrk="1" fontAlgn="auto" latinLnBrk="0" hangingPunct="1">
+              <a:lnSpc>
+                <a:spcPct val="100000"/>
+              </a:lnSpc>
+              <a:spcBef>
+                <a:spcPts val="0"/>
+              </a:spcBef>
+              <a:spcAft>
+                <a:spcPts val="0"/>
+              </a:spcAft>
+              <a:buClrTx/>
+              <a:buSzTx/>
+              <a:buFontTx/>
+              <a:buNone/>
+              <a:tabLst/>
+              <a:defRPr/>
+            </a:pPr>
+            <a:endParaRPr lang="en-US" baseline="0" dirty="0"/>
+          </a:p>
+          <a:p>
+            <a:pPr marL="0" marR="0" indent="0" algn="l" defTabSz="457200" rtl="0" eaLnBrk="1" fontAlgn="auto" latinLnBrk="0" hangingPunct="1">
+              <a:lnSpc>
+                <a:spcPct val="100000"/>
+              </a:lnSpc>
+              <a:spcBef>
+                <a:spcPts val="0"/>
+              </a:spcBef>
+              <a:spcAft>
+                <a:spcPts val="0"/>
+              </a:spcAft>
+              <a:buClrTx/>
+              <a:buSzTx/>
+              <a:buFontTx/>
+              <a:buNone/>
+              <a:tabLst/>
+              <a:defRPr/>
+            </a:pPr>
+            <a:r>
+              <a:rPr lang="en-US" baseline="0" dirty="0"/>
+              <a:t>	[If a rating of 3 was considered high instead of low, accuracies also went down, but the models did better at trying to predict high alcohol 	consumption. However, we stuck with keeping 3 in the low category due to wording in the survey.]</a:t>
+            </a:r>
+          </a:p>
+          <a:p>
+            <a:pPr marL="0" marR="0" indent="0" algn="l" defTabSz="457200" rtl="0" eaLnBrk="1" fontAlgn="auto" latinLnBrk="0" hangingPunct="1">
+              <a:lnSpc>
+                <a:spcPct val="100000"/>
+              </a:lnSpc>
+              <a:spcBef>
+                <a:spcPts val="0"/>
+              </a:spcBef>
+              <a:spcAft>
+                <a:spcPts val="0"/>
+              </a:spcAft>
+              <a:buClrTx/>
+              <a:buSzTx/>
+              <a:buFontTx/>
+              <a:buNone/>
+              <a:tabLst/>
+              <a:defRPr/>
+            </a:pPr>
+            <a:endParaRPr lang="en-US" baseline="0" dirty="0"/>
+          </a:p>
+        </p:txBody>
+      </p:sp>
+      <p:sp>
+        <p:nvSpPr>
+          <p:cNvPr id="4" name="Slide Number Placeholder 3"/>
+          <p:cNvSpPr>
+            <a:spLocks noGrp="1"/>
+          </p:cNvSpPr>
+          <p:nvPr>
+            <p:ph type="sldNum" sz="quarter" idx="10"/>
+          </p:nvPr>
+        </p:nvSpPr>
+        <p:spPr/>
+        <p:txBody>
+          <a:bodyPr/>
+          <a:lstStyle/>
+          <a:p>
+            <a:fld id="{74676316-F0E1-404C-9137-82F8B80F0ABA}" type="slidenum">
+              <a:rPr lang="en-US" smtClean="0"/>
+              <a:t>3</a:t>
+            </a:fld>
+            <a:endParaRPr lang="en-US"/>
+          </a:p>
+        </p:txBody>
+      </p:sp>
+    </p:spTree>
+    <p:extLst>
+      <p:ext uri="{BB962C8B-B14F-4D97-AF65-F5344CB8AC3E}">
+        <p14:creationId xmlns:p14="http://schemas.microsoft.com/office/powerpoint/2010/main" val="1352575294"/>
+      </p:ext>
+    </p:extLst>
+  </p:cSld>
+  <p:clrMapOvr>
+    <a:masterClrMapping/>
+  </p:clrMapOvr>
+</p:notes>
+</file>
+
+<file path=ppt/notesSlides/notesSlide3.xml><?xml version="1.0" encoding="utf-8"?>
+<p:notes xmlns:a="http://schemas.openxmlformats.org/drawingml/2006/main" xmlns:r="http://schemas.openxmlformats.org/officeDocument/2006/relationships" xmlns:p="http://schemas.openxmlformats.org/presentationml/2006/main">
+  <p:cSld>
+    <p:spTree>
+      <p:nvGrpSpPr>
+        <p:cNvPr id="1" name=""/>
+        <p:cNvGrpSpPr/>
+        <p:nvPr/>
+      </p:nvGrpSpPr>
+      <p:grpSpPr>
+        <a:xfrm>
+          <a:off x="0" y="0"/>
+          <a:ext cx="0" cy="0"/>
+          <a:chOff x="0" y="0"/>
+          <a:chExt cx="0" cy="0"/>
+        </a:xfrm>
+      </p:grpSpPr>
+      <p:sp>
+        <p:nvSpPr>
+          <p:cNvPr id="2" name="Slide Image Placeholder 1"/>
+          <p:cNvSpPr>
+            <a:spLocks noGrp="1" noRot="1" noChangeAspect="1"/>
+          </p:cNvSpPr>
+          <p:nvPr>
+            <p:ph type="sldImg"/>
+          </p:nvPr>
+        </p:nvSpPr>
+        <p:spPr/>
+      </p:sp>
+      <p:sp>
+        <p:nvSpPr>
+          <p:cNvPr id="3" name="Notes Placeholder 2"/>
+          <p:cNvSpPr>
+            <a:spLocks noGrp="1"/>
+          </p:cNvSpPr>
+          <p:nvPr>
+            <p:ph type="body" idx="1"/>
+          </p:nvPr>
+        </p:nvSpPr>
+        <p:spPr/>
+        <p:txBody>
+          <a:bodyPr/>
+          <a:lstStyle/>
+          <a:p>
+            <a:r>
+              <a:rPr lang="en-US" dirty="0"/>
               <a:t>Also tried using regression to potentially be able to predict</a:t>
             </a:r>
             <a:r>
-              <a:rPr lang="en-US" baseline="0" dirty="0" smtClean="0"/>
+              <a:rPr lang="en-US" baseline="0" dirty="0"/>
               <a:t> an alcohol consumption rating 1 – 5 from inputs</a:t>
             </a:r>
-            <a:endParaRPr lang="en-US" dirty="0" smtClean="0"/>
-          </a:p>
-          <a:p>
-            <a:endParaRPr lang="en-US" dirty="0" smtClean="0"/>
-          </a:p>
-          <a:p>
-            <a:r>
-              <a:rPr lang="en-US" dirty="0" smtClean="0"/>
+            <a:endParaRPr lang="en-US" dirty="0"/>
+          </a:p>
+          <a:p>
+            <a:endParaRPr lang="en-US" dirty="0"/>
+          </a:p>
+          <a:p>
+            <a:r>
+              <a:rPr lang="en-US" dirty="0"/>
               <a:t>Best results came from</a:t>
             </a:r>
             <a:r>
-              <a:rPr lang="en-US" baseline="0" dirty="0" smtClean="0"/>
+              <a:rPr lang="en-US" baseline="0" dirty="0"/>
               <a:t> using these variables</a:t>
             </a:r>
           </a:p>
           <a:p>
             <a:r>
-              <a:rPr lang="en-US" baseline="0" dirty="0" smtClean="0"/>
+              <a:rPr lang="en-US" baseline="0" dirty="0"/>
               <a:t>	[, which had the highest correlation with weekday and weekend alcohol consumption ratings</a:t>
             </a:r>
           </a:p>
           <a:p>
             <a:r>
-              <a:rPr lang="en-US" baseline="0" dirty="0" smtClean="0"/>
+              <a:rPr lang="en-US" baseline="0" dirty="0"/>
               <a:t>	though the highest was between the weekday and weekend ratings themselves with only 62%]</a:t>
             </a:r>
-            <a:endParaRPr lang="en-US" dirty="0" smtClean="0"/>
-          </a:p>
-          <a:p>
-            <a:endParaRPr lang="en-US" dirty="0" smtClean="0"/>
-          </a:p>
-          <a:p>
-            <a:r>
-              <a:rPr lang="en-US" dirty="0" smtClean="0"/>
+            <a:endParaRPr lang="en-US" dirty="0"/>
+          </a:p>
+          <a:p>
+            <a:endParaRPr lang="en-US" dirty="0"/>
+          </a:p>
+          <a:p>
+            <a:r>
+              <a:rPr lang="en-US" dirty="0"/>
               <a:t>This model only explains 48% of the variance in weekend</a:t>
             </a:r>
             <a:r>
-              <a:rPr lang="en-US" baseline="0" dirty="0" smtClean="0"/>
+              <a:rPr lang="en-US" baseline="0" dirty="0"/>
               <a:t> alcohol consumption rating with the independent variables considered</a:t>
             </a:r>
           </a:p>
           <a:p>
-            <a:endParaRPr lang="en-US" baseline="0" dirty="0" smtClean="0"/>
-          </a:p>
-          <a:p>
-            <a:r>
-              <a:rPr lang="en-US" dirty="0" smtClean="0"/>
+            <a:endParaRPr lang="en-US" baseline="0" dirty="0"/>
+          </a:p>
+          <a:p>
+            <a:r>
+              <a:rPr lang="en-US" dirty="0"/>
               <a:t>And it’s</a:t>
             </a:r>
             <a:r>
-              <a:rPr lang="en-US" baseline="0" dirty="0" smtClean="0"/>
+              <a:rPr lang="en-US" baseline="0" dirty="0"/>
               <a:t> not necessarily a useful model as it requires knowing the weekday rating to guess the weekend rating</a:t>
             </a:r>
           </a:p>
           <a:p>
-            <a:endParaRPr lang="en-US" baseline="0" dirty="0" smtClean="0"/>
-          </a:p>
-          <a:p>
-            <a:r>
-              <a:rPr lang="en-US" baseline="0" dirty="0" smtClean="0"/>
+            <a:endParaRPr lang="en-US" baseline="0" dirty="0"/>
+          </a:p>
+          <a:p>
+            <a:r>
+              <a:rPr lang="en-US" baseline="0" dirty="0"/>
               <a:t>	[However, if we remove the weekday rating from the independent variables, the R-squared goes down to 27%]</a:t>
             </a:r>
             <a:endParaRPr lang="en-US" dirty="0"/>
@@ -1180,7 +1281,7 @@
           <a:p>
             <a:fld id="{C6726D26-662B-144D-9DCE-CC9459C07D55}" type="datetimeFigureOut">
               <a:rPr lang="en-US" smtClean="0"/>
-              <a:t>12/2/16</a:t>
+              <a:t>12/2/2016</a:t>
             </a:fld>
             <a:endParaRPr lang="en-US"/>
           </a:p>
@@ -1348,7 +1449,7 @@
           <a:p>
             <a:fld id="{C6726D26-662B-144D-9DCE-CC9459C07D55}" type="datetimeFigureOut">
               <a:rPr lang="en-US" smtClean="0"/>
-              <a:t>12/2/16</a:t>
+              <a:t>12/2/2016</a:t>
             </a:fld>
             <a:endParaRPr lang="en-US"/>
           </a:p>
@@ -1526,7 +1627,7 @@
           <a:p>
             <a:fld id="{C6726D26-662B-144D-9DCE-CC9459C07D55}" type="datetimeFigureOut">
               <a:rPr lang="en-US" smtClean="0"/>
-              <a:t>12/2/16</a:t>
+              <a:t>12/2/2016</a:t>
             </a:fld>
             <a:endParaRPr lang="en-US"/>
           </a:p>
@@ -1694,7 +1795,7 @@
           <a:p>
             <a:fld id="{C6726D26-662B-144D-9DCE-CC9459C07D55}" type="datetimeFigureOut">
               <a:rPr lang="en-US" smtClean="0"/>
-              <a:t>12/2/16</a:t>
+              <a:t>12/2/2016</a:t>
             </a:fld>
             <a:endParaRPr lang="en-US"/>
           </a:p>
@@ -1939,7 +2040,7 @@
           <a:p>
             <a:fld id="{C6726D26-662B-144D-9DCE-CC9459C07D55}" type="datetimeFigureOut">
               <a:rPr lang="en-US" smtClean="0"/>
-              <a:t>12/2/16</a:t>
+              <a:t>12/2/2016</a:t>
             </a:fld>
             <a:endParaRPr lang="en-US"/>
           </a:p>
@@ -2168,7 +2269,7 @@
           <a:p>
             <a:fld id="{C6726D26-662B-144D-9DCE-CC9459C07D55}" type="datetimeFigureOut">
               <a:rPr lang="en-US" smtClean="0"/>
-              <a:t>12/2/16</a:t>
+              <a:t>12/2/2016</a:t>
             </a:fld>
             <a:endParaRPr lang="en-US"/>
           </a:p>
@@ -2532,7 +2633,7 @@
           <a:p>
             <a:fld id="{C6726D26-662B-144D-9DCE-CC9459C07D55}" type="datetimeFigureOut">
               <a:rPr lang="en-US" smtClean="0"/>
-              <a:t>12/2/16</a:t>
+              <a:t>12/2/2016</a:t>
             </a:fld>
             <a:endParaRPr lang="en-US"/>
           </a:p>
@@ -2649,7 +2750,7 @@
           <a:p>
             <a:fld id="{C6726D26-662B-144D-9DCE-CC9459C07D55}" type="datetimeFigureOut">
               <a:rPr lang="en-US" smtClean="0"/>
-              <a:t>12/2/16</a:t>
+              <a:t>12/2/2016</a:t>
             </a:fld>
             <a:endParaRPr lang="en-US"/>
           </a:p>
@@ -2744,7 +2845,7 @@
           <a:p>
             <a:fld id="{C6726D26-662B-144D-9DCE-CC9459C07D55}" type="datetimeFigureOut">
               <a:rPr lang="en-US" smtClean="0"/>
-              <a:t>12/2/16</a:t>
+              <a:t>12/2/2016</a:t>
             </a:fld>
             <a:endParaRPr lang="en-US"/>
           </a:p>
@@ -3019,7 +3120,7 @@
           <a:p>
             <a:fld id="{C6726D26-662B-144D-9DCE-CC9459C07D55}" type="datetimeFigureOut">
               <a:rPr lang="en-US" smtClean="0"/>
-              <a:t>12/2/16</a:t>
+              <a:t>12/2/2016</a:t>
             </a:fld>
             <a:endParaRPr lang="en-US"/>
           </a:p>
@@ -3271,7 +3372,7 @@
           <a:p>
             <a:fld id="{C6726D26-662B-144D-9DCE-CC9459C07D55}" type="datetimeFigureOut">
               <a:rPr lang="en-US" smtClean="0"/>
-              <a:t>12/2/16</a:t>
+              <a:t>12/2/2016</a:t>
             </a:fld>
             <a:endParaRPr lang="en-US"/>
           </a:p>
@@ -3482,7 +3583,7 @@
           <a:p>
             <a:fld id="{C6726D26-662B-144D-9DCE-CC9459C07D55}" type="datetimeFigureOut">
               <a:rPr lang="en-US" smtClean="0"/>
-              <a:t>12/2/16</a:t>
+              <a:t>12/2/2016</a:t>
             </a:fld>
             <a:endParaRPr lang="en-US"/>
           </a:p>
@@ -3919,10 +4020,15 @@
             <p:ph idx="1"/>
           </p:nvPr>
         </p:nvSpPr>
-        <p:spPr/>
+        <p:spPr>
+          <a:xfrm>
+            <a:off x="838200" y="1549854"/>
+            <a:ext cx="10515600" cy="4351338"/>
+          </a:xfrm>
+        </p:spPr>
         <p:txBody>
           <a:bodyPr>
-            <a:normAutofit fontScale="92500" lnSpcReduction="10000"/>
+            <a:normAutofit/>
           </a:bodyPr>
           <a:lstStyle/>
           <a:p>
@@ -3935,28 +4041,7 @@
             <a:pPr lvl="1"/>
             <a:r>
               <a:rPr lang="en-US" dirty="0"/>
-              <a:t>Students were surveyed in either a math class or Portuguese language class</a:t>
-            </a:r>
-          </a:p>
-          <a:p>
-            <a:pPr lvl="1"/>
-            <a:r>
-              <a:rPr lang="en-US" dirty="0"/>
-              <a:t>Ages ranged from 15 to 22</a:t>
-            </a:r>
-          </a:p>
-          <a:p>
-            <a:pPr lvl="1"/>
-            <a:r>
-              <a:rPr lang="en-US" dirty="0"/>
               <a:t>Alcohol consumption was reported in terms of a 1 (very low) to 5 (very high) rating on weekdays and weekends</a:t>
-            </a:r>
-          </a:p>
-          <a:p>
-            <a:pPr lvl="1"/>
-            <a:r>
-              <a:rPr lang="en-US" dirty="0"/>
-              <a:t>31 other variables included family demographics, school performance, and social activities</a:t>
             </a:r>
           </a:p>
           <a:p>
@@ -3973,21 +4058,14 @@
             </a:r>
           </a:p>
           <a:p>
-            <a:pPr lvl="1"/>
             <a:r>
               <a:rPr lang="en-US" dirty="0"/>
-              <a:t>Students were from chemical engineering department and data science course</a:t>
-            </a:r>
-          </a:p>
-          <a:p>
-            <a:pPr lvl="1"/>
-            <a:r>
-              <a:rPr lang="en-US" dirty="0"/>
-              <a:t>Subset of variables from main data were included</a:t>
-            </a:r>
-          </a:p>
-          <a:p>
-            <a:pPr lvl="1"/>
+              <a:t>Duplicates were present in the data, so a merge </a:t>
+            </a:r>
+            <a:r>
+              <a:rPr lang="en-US"/>
+              <a:t>was performed</a:t>
+            </a:r>
             <a:endParaRPr lang="en-US" dirty="0"/>
           </a:p>
         </p:txBody>
@@ -4513,13 +4591,13 @@
               <a:buChar char="§"/>
             </a:pPr>
             <a:r>
-              <a:rPr lang="en-US" sz="2000" dirty="0" smtClean="0"/>
+              <a:rPr lang="en-US" sz="2000" dirty="0"/>
               <a:t>Clustering and dimensionality reduction visualization showed the dataset is really one big cluster</a:t>
             </a:r>
           </a:p>
           <a:p>
             <a:pPr lvl="1"/>
-            <a:endParaRPr lang="en-US" sz="2000" dirty="0" smtClean="0"/>
+            <a:endParaRPr lang="en-US" sz="2000" dirty="0"/>
           </a:p>
           <a:p>
             <a:pPr marL="342900" lvl="1" indent="-342900">
@@ -4527,16 +4605,8 @@
               <a:buChar char="§"/>
             </a:pPr>
             <a:r>
-              <a:rPr lang="en-US" sz="2000" dirty="0" smtClean="0"/>
-              <a:t>The best model for predicting high vs. low alcohol consumption came from a decision tree</a:t>
-            </a:r>
-            <a:r>
               <a:rPr lang="en-US" sz="2000" dirty="0"/>
-              <a:t> </a:t>
-            </a:r>
-            <a:r>
-              <a:rPr lang="en-US" sz="2000" dirty="0" smtClean="0"/>
-              <a:t>model on weekends </a:t>
+              <a:t>The best model for predicting high vs. low alcohol consumption came from a decision tree model on weekends </a:t>
             </a:r>
           </a:p>
           <a:p>
@@ -4545,7 +4615,7 @@
               <a:buChar char="§"/>
             </a:pPr>
             <a:r>
-              <a:rPr lang="en-US" sz="2000" dirty="0" smtClean="0"/>
+              <a:rPr lang="en-US" sz="2000" dirty="0"/>
               <a:t>max depth 5</a:t>
             </a:r>
           </a:p>
@@ -4555,7 +4625,7 @@
               <a:buChar char="§"/>
             </a:pPr>
             <a:r>
-              <a:rPr lang="en-US" sz="2000" dirty="0" smtClean="0"/>
+              <a:rPr lang="en-US" sz="2000" dirty="0"/>
               <a:t>min split 100 </a:t>
             </a:r>
           </a:p>
@@ -4565,7 +4635,7 @@
               <a:buChar char="§"/>
             </a:pPr>
             <a:r>
-              <a:rPr lang="en-US" sz="2000" dirty="0" smtClean="0"/>
+              <a:rPr lang="en-US" sz="2000" dirty="0"/>
               <a:t>84.2% accuracy</a:t>
             </a:r>
           </a:p>
@@ -4574,7 +4644,7 @@
               <a:buFont typeface="Wingdings" charset="2"/>
               <a:buChar char="§"/>
             </a:pPr>
-            <a:endParaRPr lang="en-US" sz="2000" dirty="0" smtClean="0"/>
+            <a:endParaRPr lang="en-US" sz="2000" dirty="0"/>
           </a:p>
           <a:p>
             <a:pPr marL="342900" indent="-342900">
@@ -4582,7 +4652,7 @@
               <a:buChar char="§"/>
             </a:pPr>
             <a:r>
-              <a:rPr lang="en-US" sz="2000" dirty="0" smtClean="0"/>
+              <a:rPr lang="en-US" sz="2000" dirty="0"/>
               <a:t>This dataset was not good enough for predicting alcohol consumption</a:t>
             </a:r>
           </a:p>
@@ -4592,7 +4662,7 @@
               <a:buChar char="§"/>
             </a:pPr>
             <a:r>
-              <a:rPr lang="en-US" sz="2000" dirty="0" smtClean="0"/>
+              <a:rPr lang="en-US" sz="2000" dirty="0"/>
               <a:t>Not large enough</a:t>
             </a:r>
           </a:p>
@@ -4602,7 +4672,7 @@
               <a:buChar char="§"/>
             </a:pPr>
             <a:r>
-              <a:rPr lang="en-US" sz="2000" dirty="0" smtClean="0"/>
+              <a:rPr lang="en-US" sz="2000" dirty="0"/>
               <a:t>Doesn’t contain the best features</a:t>
             </a:r>
           </a:p>
@@ -4612,7 +4682,7 @@
               <a:buChar char="§"/>
             </a:pPr>
             <a:r>
-              <a:rPr lang="en-US" sz="2000" dirty="0" smtClean="0"/>
+              <a:rPr lang="en-US" sz="2000" dirty="0"/>
               <a:t>Subjective and incomplete data</a:t>
             </a:r>
           </a:p>
@@ -4641,10 +4711,9 @@
           <a:lstStyle/>
           <a:p>
             <a:r>
-              <a:rPr lang="en-US" sz="2800" b="1" dirty="0" smtClean="0"/>
+              <a:rPr lang="en-US" sz="2800" b="1" dirty="0"/>
               <a:t>Conclusion</a:t>
             </a:r>
-            <a:endParaRPr lang="en-US" sz="2800" b="1" dirty="0" smtClean="0"/>
           </a:p>
         </p:txBody>
       </p:sp>
@@ -4658,13 +4727,6 @@
   <p:clrMapOvr>
     <a:masterClrMapping/>
   </p:clrMapOvr>
-  <p:timing>
-    <p:tnLst>
-      <p:par>
-        <p:cTn xmlns:p14="http://schemas.microsoft.com/office/powerpoint/2010/main" id="1" dur="indefinite" restart="never" nodeType="tmRoot"/>
-      </p:par>
-    </p:tnLst>
-  </p:timing>
 </p:sld>
 </file>
 
@@ -4853,14 +4915,9 @@
             <a:lstStyle/>
             <a:p>
               <a:r>
-                <a:rPr lang="en-US" dirty="0" smtClean="0"/>
-                <a:t>Weekday Model </a:t>
+                <a:rPr lang="en-US" dirty="0"/>
+                <a:t>Weekday Model Confusion Matrix</a:t>
               </a:r>
-              <a:r>
-                <a:rPr lang="en-US" dirty="0" smtClean="0"/>
-                <a:t>Confusion Matrix</a:t>
-              </a:r>
-              <a:endParaRPr lang="en-US" dirty="0"/>
             </a:p>
           </p:txBody>
         </p:sp>
@@ -4892,7 +4949,7 @@
               <a:buChar char="§"/>
             </a:pPr>
             <a:r>
-              <a:rPr lang="en-US" sz="2000" b="1" dirty="0" smtClean="0"/>
+              <a:rPr lang="en-US" sz="2000" b="1" dirty="0"/>
               <a:t>SVM </a:t>
             </a:r>
           </a:p>
@@ -4902,7 +4959,7 @@
               <a:buChar char="•"/>
             </a:pPr>
             <a:r>
-              <a:rPr lang="en-US" sz="2000" dirty="0" smtClean="0"/>
+              <a:rPr lang="en-US" sz="2000" dirty="0"/>
               <a:t>C = 2.2 weekend</a:t>
             </a:r>
           </a:p>
@@ -4912,7 +4969,7 @@
               <a:buChar char="•"/>
             </a:pPr>
             <a:r>
-              <a:rPr lang="en-US" sz="2000" dirty="0" smtClean="0"/>
+              <a:rPr lang="en-US" sz="2000" dirty="0"/>
               <a:t>C &lt; 3.4 weekday</a:t>
             </a:r>
           </a:p>
@@ -4922,11 +4979,11 @@
               <a:buChar char="•"/>
             </a:pPr>
             <a:r>
-              <a:rPr lang="en-US" sz="2000" dirty="0" err="1" smtClean="0"/>
+              <a:rPr lang="en-US" sz="2000" dirty="0" err="1"/>
               <a:t>Rbf</a:t>
             </a:r>
             <a:r>
-              <a:rPr lang="en-US" sz="2000" dirty="0" smtClean="0"/>
+              <a:rPr lang="en-US" sz="2000" dirty="0"/>
               <a:t> kernel</a:t>
             </a:r>
           </a:p>
@@ -4935,7 +4992,7 @@
               <a:buFont typeface="Arial"/>
               <a:buChar char="•"/>
             </a:pPr>
-            <a:endParaRPr lang="en-US" sz="2000" dirty="0" smtClean="0"/>
+            <a:endParaRPr lang="en-US" sz="2000" dirty="0"/>
           </a:p>
           <a:p>
             <a:pPr marL="342900" indent="-342900">
@@ -4943,7 +5000,7 @@
               <a:buChar char="§"/>
             </a:pPr>
             <a:r>
-              <a:rPr lang="en-US" sz="2000" b="1" dirty="0" smtClean="0"/>
+              <a:rPr lang="en-US" sz="2000" b="1" dirty="0"/>
               <a:t>Decision Trees</a:t>
             </a:r>
           </a:p>
@@ -4953,10 +5010,9 @@
               <a:buChar char="•"/>
             </a:pPr>
             <a:r>
-              <a:rPr lang="en-US" sz="2000" dirty="0" smtClean="0"/>
+              <a:rPr lang="en-US" sz="2000" dirty="0"/>
               <a:t>Max depth = 5, min split = 100 weekend</a:t>
             </a:r>
-            <a:endParaRPr lang="en-US" sz="2000" dirty="0" smtClean="0"/>
           </a:p>
           <a:p>
             <a:pPr marL="742950" lvl="1" indent="-285750">
@@ -4964,7 +5020,7 @@
               <a:buChar char="•"/>
             </a:pPr>
             <a:r>
-              <a:rPr lang="en-US" sz="2000" dirty="0" smtClean="0"/>
+              <a:rPr lang="en-US" sz="2000" dirty="0"/>
               <a:t>Max depth = 4, min split = 100 weekday</a:t>
             </a:r>
           </a:p>
@@ -4973,7 +5029,7 @@
               <a:buFont typeface="Arial"/>
               <a:buChar char="•"/>
             </a:pPr>
-            <a:endParaRPr lang="en-US" sz="2000" dirty="0" smtClean="0"/>
+            <a:endParaRPr lang="en-US" sz="2000" dirty="0"/>
           </a:p>
           <a:p>
             <a:pPr marL="342900" indent="-342900">
@@ -4981,7 +5037,7 @@
               <a:buChar char="§"/>
             </a:pPr>
             <a:r>
-              <a:rPr lang="en-US" sz="2000" b="1" dirty="0" smtClean="0"/>
+              <a:rPr lang="en-US" sz="2000" b="1" dirty="0"/>
               <a:t>K-Nearest Neighbors</a:t>
             </a:r>
           </a:p>
@@ -4991,11 +5047,11 @@
               <a:buChar char="•"/>
             </a:pPr>
             <a:r>
-              <a:rPr lang="en-US" sz="2000" dirty="0" smtClean="0"/>
+              <a:rPr lang="en-US" sz="2000" dirty="0"/>
               <a:t>20 </a:t>
             </a:r>
             <a:r>
-              <a:rPr lang="en-US" sz="2000" b="0" i="0" dirty="0" smtClean="0">
+              <a:rPr lang="en-US" sz="2000" b="0" i="0" dirty="0">
                 <a:latin typeface="ＭＳ ゴシック"/>
                 <a:ea typeface="ＭＳ ゴシック"/>
                 <a:cs typeface="ＭＳ ゴシック"/>
@@ -5003,11 +5059,11 @@
               <a:t>≥</a:t>
             </a:r>
             <a:r>
-              <a:rPr lang="en-US" sz="2000" dirty="0" smtClean="0"/>
+              <a:rPr lang="en-US" sz="2000" dirty="0"/>
               <a:t> k </a:t>
             </a:r>
             <a:r>
-              <a:rPr lang="en-US" sz="2000" b="0" i="0" dirty="0" smtClean="0">
+              <a:rPr lang="en-US" sz="2000" b="0" i="0" dirty="0">
                 <a:latin typeface="ＭＳ ゴシック"/>
                 <a:ea typeface="ＭＳ ゴシック"/>
                 <a:cs typeface="ＭＳ ゴシック"/>
@@ -5015,7 +5071,7 @@
               <a:t>≥</a:t>
             </a:r>
             <a:r>
-              <a:rPr lang="en-US" sz="2000" dirty="0" smtClean="0"/>
+              <a:rPr lang="en-US" sz="2000" dirty="0"/>
               <a:t> 30 weekend</a:t>
             </a:r>
           </a:p>
@@ -5025,11 +5081,11 @@
               <a:buChar char="•"/>
             </a:pPr>
             <a:r>
-              <a:rPr lang="en-US" sz="2000" dirty="0" smtClean="0"/>
+              <a:rPr lang="en-US" sz="2000" dirty="0"/>
               <a:t>k </a:t>
             </a:r>
             <a:r>
-              <a:rPr lang="en-US" sz="2000" b="0" i="0" dirty="0" smtClean="0">
+              <a:rPr lang="en-US" sz="2000" b="0" i="0" dirty="0">
                 <a:latin typeface="ＭＳ ゴシック"/>
                 <a:ea typeface="ＭＳ ゴシック"/>
                 <a:cs typeface="ＭＳ ゴシック"/>
@@ -5037,7 +5093,7 @@
               <a:t>≥</a:t>
             </a:r>
             <a:r>
-              <a:rPr lang="en-US" sz="2000" dirty="0" smtClean="0"/>
+              <a:rPr lang="en-US" sz="2000" dirty="0"/>
               <a:t> 10 weekday</a:t>
             </a:r>
           </a:p>
@@ -5047,7 +5103,7 @@
               <a:buChar char="•"/>
             </a:pPr>
             <a:r>
-              <a:rPr lang="en-US" sz="2000" dirty="0" smtClean="0"/>
+              <a:rPr lang="en-US" sz="2000" dirty="0"/>
               <a:t>Weighted by distance</a:t>
             </a:r>
           </a:p>
@@ -5076,12 +5132,8 @@
           <a:lstStyle/>
           <a:p>
             <a:r>
-              <a:rPr lang="en-US" sz="2800" b="1" dirty="0" smtClean="0"/>
-              <a:t>Exploring </a:t>
-            </a:r>
-            <a:r>
-              <a:rPr lang="en-US" sz="2800" b="1" dirty="0" smtClean="0"/>
-              <a:t>Classification</a:t>
+              <a:rPr lang="en-US" sz="2800" b="1" dirty="0"/>
+              <a:t>Exploring Classification</a:t>
             </a:r>
           </a:p>
         </p:txBody>
@@ -5123,10 +5175,9 @@
             <a:lstStyle/>
             <a:p>
               <a:r>
-                <a:rPr lang="en-US" sz="2800" b="1" dirty="0" smtClean="0"/>
+                <a:rPr lang="en-US" sz="2800" b="1" dirty="0"/>
                 <a:t>Neural Networks</a:t>
               </a:r>
-              <a:endParaRPr lang="en-US" sz="2800" b="1" dirty="0" smtClean="0"/>
             </a:p>
           </p:txBody>
         </p:sp>
@@ -5157,7 +5208,7 @@
                 <a:buChar char="§"/>
               </a:pPr>
               <a:r>
-                <a:rPr lang="en-US" sz="2000" dirty="0" smtClean="0"/>
+                <a:rPr lang="en-US" sz="2000" dirty="0"/>
                 <a:t>125 nodes</a:t>
               </a:r>
             </a:p>
@@ -5207,7 +5258,7 @@
   <p:timing>
     <p:tnLst>
       <p:par>
-        <p:cTn xmlns:p14="http://schemas.microsoft.com/office/powerpoint/2010/main" id="1" dur="indefinite" restart="never" nodeType="tmRoot">
+        <p:cTn id="1" dur="indefinite" restart="never" nodeType="tmRoot">
           <p:childTnLst>
             <p:seq concurrent="1" nextAc="seek">
               <p:cTn id="2" dur="indefinite" nodeType="mainSeq">
@@ -5460,14 +5511,13 @@
           <a:lstStyle/>
           <a:p>
             <a:r>
-              <a:rPr lang="en-US" sz="2800" b="1" dirty="0" err="1" smtClean="0"/>
+              <a:rPr lang="en-US" sz="2800" b="1" dirty="0" err="1"/>
               <a:t>Multilinear</a:t>
             </a:r>
             <a:r>
-              <a:rPr lang="en-US" sz="2800" b="1" dirty="0" smtClean="0"/>
+              <a:rPr lang="en-US" sz="2800" b="1" dirty="0"/>
               <a:t> Regression</a:t>
             </a:r>
-            <a:endParaRPr lang="en-US" sz="2800" b="1" dirty="0" smtClean="0"/>
           </a:p>
         </p:txBody>
       </p:sp>
@@ -5498,7 +5548,7 @@
               <a:buChar char="§"/>
             </a:pPr>
             <a:r>
-              <a:rPr lang="en-US" sz="2000" dirty="0" smtClean="0"/>
+              <a:rPr lang="en-US" sz="2000" dirty="0"/>
               <a:t>Independent variables:</a:t>
             </a:r>
           </a:p>
@@ -5508,16 +5558,8 @@
               <a:buChar char="•"/>
             </a:pPr>
             <a:r>
-              <a:rPr lang="en-US" sz="2000" dirty="0" smtClean="0"/>
-              <a:t>Weekday alcohol </a:t>
-            </a:r>
-            <a:r>
               <a:rPr lang="en-US" sz="2000" dirty="0"/>
-              <a:t>c</a:t>
-            </a:r>
-            <a:r>
-              <a:rPr lang="en-US" sz="2000" dirty="0" smtClean="0"/>
-              <a:t>onsumption</a:t>
+              <a:t>Weekday alcohol consumption</a:t>
             </a:r>
           </a:p>
           <a:p>
@@ -5526,7 +5568,7 @@
               <a:buChar char="•"/>
             </a:pPr>
             <a:r>
-              <a:rPr lang="en-US" sz="2000" dirty="0" smtClean="0"/>
+              <a:rPr lang="en-US" sz="2000" dirty="0"/>
               <a:t>Frequency of outings</a:t>
             </a:r>
           </a:p>
@@ -5536,7 +5578,7 @@
               <a:buChar char="•"/>
             </a:pPr>
             <a:r>
-              <a:rPr lang="en-US" sz="2000" dirty="0" smtClean="0"/>
+              <a:rPr lang="en-US" sz="2000" dirty="0"/>
               <a:t>Gender</a:t>
             </a:r>
           </a:p>
@@ -5546,13 +5588,13 @@
               <a:buChar char="•"/>
             </a:pPr>
             <a:r>
-              <a:rPr lang="en-US" sz="2000" dirty="0" smtClean="0"/>
+              <a:rPr lang="en-US" sz="2000" dirty="0"/>
               <a:t>Frequency of time spent on studying</a:t>
             </a:r>
           </a:p>
           <a:p>
             <a:pPr lvl="1"/>
-            <a:endParaRPr lang="en-US" sz="2000" dirty="0" smtClean="0"/>
+            <a:endParaRPr lang="en-US" sz="2000" dirty="0"/>
           </a:p>
           <a:p>
             <a:pPr marL="342900" indent="-342900">
@@ -5560,7 +5602,7 @@
               <a:buChar char="§"/>
             </a:pPr>
             <a:r>
-              <a:rPr lang="en-US" sz="2000" dirty="0" smtClean="0"/>
+              <a:rPr lang="en-US" sz="2000" dirty="0"/>
               <a:t>Dependent variable:</a:t>
             </a:r>
           </a:p>
@@ -5570,13 +5612,13 @@
               <a:buChar char="•"/>
             </a:pPr>
             <a:r>
-              <a:rPr lang="en-US" sz="2000" dirty="0" smtClean="0"/>
+              <a:rPr lang="en-US" sz="2000" dirty="0"/>
               <a:t>Weekend alcohol consumption</a:t>
             </a:r>
           </a:p>
           <a:p>
             <a:pPr lvl="1"/>
-            <a:endParaRPr lang="en-US" sz="2000" dirty="0" smtClean="0"/>
+            <a:endParaRPr lang="en-US" sz="2000" dirty="0"/>
           </a:p>
           <a:p>
             <a:pPr marL="342900" indent="-342900">
@@ -5584,15 +5626,15 @@
               <a:buChar char="§"/>
             </a:pPr>
             <a:r>
-              <a:rPr lang="en-US" sz="2000" dirty="0" smtClean="0"/>
+              <a:rPr lang="en-US" sz="2000" dirty="0"/>
               <a:t>R</a:t>
             </a:r>
             <a:r>
-              <a:rPr lang="en-US" sz="2000" baseline="30000" dirty="0" smtClean="0"/>
+              <a:rPr lang="en-US" sz="2000" baseline="30000" dirty="0"/>
               <a:t>2</a:t>
             </a:r>
             <a:r>
-              <a:rPr lang="en-US" sz="2000" dirty="0" smtClean="0"/>
+              <a:rPr lang="en-US" sz="2000" dirty="0"/>
               <a:t> = 0.484</a:t>
             </a:r>
           </a:p>
@@ -5601,7 +5643,7 @@
               <a:buFont typeface="Wingdings" charset="2"/>
               <a:buChar char="§"/>
             </a:pPr>
-            <a:endParaRPr lang="en-US" sz="2000" dirty="0" smtClean="0"/>
+            <a:endParaRPr lang="en-US" sz="2000" dirty="0"/>
           </a:p>
         </p:txBody>
       </p:sp>
@@ -5615,13 +5657,6 @@
   <p:clrMapOvr>
     <a:masterClrMapping/>
   </p:clrMapOvr>
-  <p:timing>
-    <p:tnLst>
-      <p:par>
-        <p:cTn xmlns:p14="http://schemas.microsoft.com/office/powerpoint/2010/main" id="1" dur="indefinite" restart="never" nodeType="tmRoot"/>
-      </p:par>
-    </p:tnLst>
-  </p:timing>
 </p:sld>
 </file>
 
@@ -6506,7 +6541,7 @@
   <a:extraClrSchemeLst/>
   <a:extLst>
     <a:ext uri="{05A4C25C-085E-4340-85A3-A5531E510DB2}">
-      <thm15:themeFamily xmlns:thm15="http://schemas.microsoft.com/office/thememl/2012/main" xmlns="" name="Office Theme" id="{62F939B6-93AF-4DB8-9C6B-D6C7DFDC589F}" vid="{4A3C46E8-61CC-4603-A589-7422A47A8E4A}"/>
+      <thm15:themeFamily xmlns:thm15="http://schemas.microsoft.com/office/thememl/2012/main" name="Office Theme" id="{62F939B6-93AF-4DB8-9C6B-D6C7DFDC589F}" vid="{4A3C46E8-61CC-4603-A589-7422A47A8E4A}"/>
     </a:ext>
   </a:extLst>
 </a:theme>

</xml_diff>